<commit_message>
added link to jupyter notebook
</commit_message>
<xml_diff>
--- a/PPT presentation/Slides.pptx
+++ b/PPT presentation/Slides.pptx
@@ -17472,6 +17472,45 @@
           </a:p>
         </p:txBody>
       </p:sp>
+      <p:sp>
+        <p:nvSpPr>
+          <p:cNvPr id="2" name="TextBox 1"/>
+          <p:cNvSpPr txBox="1"/>
+          <p:nvPr/>
+        </p:nvSpPr>
+        <p:spPr>
+          <a:xfrm>
+            <a:off x="685798" y="3318563"/>
+            <a:ext cx="3766088" cy="307777"/>
+          </a:xfrm>
+          <a:prstGeom prst="rect">
+            <a:avLst/>
+          </a:prstGeom>
+          <a:noFill/>
+        </p:spPr>
+        <p:txBody>
+          <a:bodyPr wrap="square" rtlCol="0">
+            <a:spAutoFit/>
+          </a:bodyPr>
+          <a:lstStyle/>
+          <a:p>
+            <a:r>
+              <a:rPr lang="en-US" dirty="0" smtClean="0">
+                <a:latin typeface="montserrat light" charset="0"/>
+                <a:hlinkClick r:id="rId3"/>
+              </a:rPr>
+              <a:t>Take a peek behind the curtain</a:t>
+            </a:r>
+            <a:r>
+              <a:rPr lang="en-US" dirty="0" smtClean="0">
+                <a:hlinkClick r:id="rId3"/>
+              </a:rPr>
+              <a:t>.</a:t>
+            </a:r>
+            <a:endParaRPr lang="en-US" dirty="0"/>
+          </a:p>
+        </p:txBody>
+      </p:sp>
     </p:spTree>
     <p:extLst>
       <p:ext uri="{BB962C8B-B14F-4D97-AF65-F5344CB8AC3E}">

</xml_diff>